<commit_message>
APIs for Google Maps... Read GoogleMapsLink for more info
</commit_message>
<xml_diff>
--- a/CTF_PPT.pptx
+++ b/CTF_PPT.pptx
@@ -7,6 +7,7 @@
   <p:sldIdLst>
     <p:sldId id="256" r:id="rId2"/>
     <p:sldId id="257" r:id="rId3"/>
+    <p:sldId id="258" r:id="rId4"/>
   </p:sldIdLst>
   <p:sldSz cx="12192000" cy="6858000"/>
   <p:notesSz cx="6858000" cy="9144000"/>
@@ -105,6 +106,11 @@
       </a:defRPr>
     </a:lvl9pPr>
   </p:defaultTextStyle>
+  <p:extLst>
+    <p:ext uri="{EFAFB233-063F-42B5-8137-9DF3F51BA10A}">
+      <p15:sldGuideLst xmlns:p15="http://schemas.microsoft.com/office/powerpoint/2012/main"/>
+    </p:ext>
+  </p:extLst>
 </p:presentation>
 </file>
 
@@ -239,7 +245,7 @@
           <a:p>
             <a:fld id="{B0F4803E-A9F5-420F-9C00-6EA375DAE27A}" type="datetimeFigureOut">
               <a:rPr lang="en-US" smtClean="0"/>
-              <a:t>5/1/2014</a:t>
+              <a:t>5/2/2014</a:t>
             </a:fld>
             <a:endParaRPr lang="en-US"/>
           </a:p>
@@ -409,7 +415,7 @@
           <a:p>
             <a:fld id="{B0F4803E-A9F5-420F-9C00-6EA375DAE27A}" type="datetimeFigureOut">
               <a:rPr lang="en-US" smtClean="0"/>
-              <a:t>5/1/2014</a:t>
+              <a:t>5/2/2014</a:t>
             </a:fld>
             <a:endParaRPr lang="en-US"/>
           </a:p>
@@ -589,7 +595,7 @@
           <a:p>
             <a:fld id="{B0F4803E-A9F5-420F-9C00-6EA375DAE27A}" type="datetimeFigureOut">
               <a:rPr lang="en-US" smtClean="0"/>
-              <a:t>5/1/2014</a:t>
+              <a:t>5/2/2014</a:t>
             </a:fld>
             <a:endParaRPr lang="en-US"/>
           </a:p>
@@ -759,7 +765,7 @@
           <a:p>
             <a:fld id="{B0F4803E-A9F5-420F-9C00-6EA375DAE27A}" type="datetimeFigureOut">
               <a:rPr lang="en-US" smtClean="0"/>
-              <a:t>5/1/2014</a:t>
+              <a:t>5/2/2014</a:t>
             </a:fld>
             <a:endParaRPr lang="en-US"/>
           </a:p>
@@ -1005,7 +1011,7 @@
           <a:p>
             <a:fld id="{B0F4803E-A9F5-420F-9C00-6EA375DAE27A}" type="datetimeFigureOut">
               <a:rPr lang="en-US" smtClean="0"/>
-              <a:t>5/1/2014</a:t>
+              <a:t>5/2/2014</a:t>
             </a:fld>
             <a:endParaRPr lang="en-US"/>
           </a:p>
@@ -1237,7 +1243,7 @@
           <a:p>
             <a:fld id="{B0F4803E-A9F5-420F-9C00-6EA375DAE27A}" type="datetimeFigureOut">
               <a:rPr lang="en-US" smtClean="0"/>
-              <a:t>5/1/2014</a:t>
+              <a:t>5/2/2014</a:t>
             </a:fld>
             <a:endParaRPr lang="en-US"/>
           </a:p>
@@ -1604,7 +1610,7 @@
           <a:p>
             <a:fld id="{B0F4803E-A9F5-420F-9C00-6EA375DAE27A}" type="datetimeFigureOut">
               <a:rPr lang="en-US" smtClean="0"/>
-              <a:t>5/1/2014</a:t>
+              <a:t>5/2/2014</a:t>
             </a:fld>
             <a:endParaRPr lang="en-US"/>
           </a:p>
@@ -1722,7 +1728,7 @@
           <a:p>
             <a:fld id="{B0F4803E-A9F5-420F-9C00-6EA375DAE27A}" type="datetimeFigureOut">
               <a:rPr lang="en-US" smtClean="0"/>
-              <a:t>5/1/2014</a:t>
+              <a:t>5/2/2014</a:t>
             </a:fld>
             <a:endParaRPr lang="en-US"/>
           </a:p>
@@ -1817,7 +1823,7 @@
           <a:p>
             <a:fld id="{B0F4803E-A9F5-420F-9C00-6EA375DAE27A}" type="datetimeFigureOut">
               <a:rPr lang="en-US" smtClean="0"/>
-              <a:t>5/1/2014</a:t>
+              <a:t>5/2/2014</a:t>
             </a:fld>
             <a:endParaRPr lang="en-US"/>
           </a:p>
@@ -2094,7 +2100,7 @@
           <a:p>
             <a:fld id="{B0F4803E-A9F5-420F-9C00-6EA375DAE27A}" type="datetimeFigureOut">
               <a:rPr lang="en-US" smtClean="0"/>
-              <a:t>5/1/2014</a:t>
+              <a:t>5/2/2014</a:t>
             </a:fld>
             <a:endParaRPr lang="en-US"/>
           </a:p>
@@ -2347,7 +2353,7 @@
           <a:p>
             <a:fld id="{B0F4803E-A9F5-420F-9C00-6EA375DAE27A}" type="datetimeFigureOut">
               <a:rPr lang="en-US" smtClean="0"/>
-              <a:t>5/1/2014</a:t>
+              <a:t>5/2/2014</a:t>
             </a:fld>
             <a:endParaRPr lang="en-US"/>
           </a:p>
@@ -2560,7 +2566,7 @@
           <a:p>
             <a:fld id="{B0F4803E-A9F5-420F-9C00-6EA375DAE27A}" type="datetimeFigureOut">
               <a:rPr lang="en-US" smtClean="0"/>
-              <a:t>5/1/2014</a:t>
+              <a:t>5/2/2014</a:t>
             </a:fld>
             <a:endParaRPr lang="en-US"/>
           </a:p>
@@ -3078,7 +3084,12 @@
             <p:ph type="title"/>
           </p:nvPr>
         </p:nvSpPr>
-        <p:spPr/>
+        <p:spPr>
+          <a:xfrm>
+            <a:off x="0" y="5177"/>
+            <a:ext cx="10515600" cy="1325563"/>
+          </a:xfrm>
+        </p:spPr>
         <p:txBody>
           <a:bodyPr/>
           <a:lstStyle/>
@@ -3784,7 +3795,7 @@
         <p:spPr>
           <a:xfrm>
             <a:off x="613611" y="3438777"/>
-            <a:ext cx="2058344" cy="2031325"/>
+            <a:ext cx="2058344" cy="923330"/>
           </a:xfrm>
           <a:prstGeom prst="rect">
             <a:avLst/>
@@ -3808,7 +3819,7 @@
             </a:pPr>
             <a:r>
               <a:rPr lang="en-US" dirty="0" smtClean="0"/>
-              <a:t>Create A Game</a:t>
+              <a:t>Join Game</a:t>
             </a:r>
           </a:p>
           <a:p>
@@ -3818,7 +3829,7 @@
             </a:pPr>
             <a:r>
               <a:rPr lang="en-US" dirty="0" smtClean="0"/>
-              <a:t>Join A Game</a:t>
+              <a:t>Start Game</a:t>
             </a:r>
           </a:p>
           <a:p>
@@ -3827,40 +3838,18 @@
               <a:buChar char="•"/>
             </a:pPr>
             <a:r>
-              <a:rPr lang="en-US" dirty="0" smtClean="0"/>
-              <a:t>Options</a:t>
-            </a:r>
-            <a:endParaRPr lang="en-US" dirty="0"/>
-          </a:p>
-          <a:p>
-            <a:pPr marL="285750" indent="-285750">
-              <a:buFont typeface="Arial" panose="020B0604020202020204" pitchFamily="34" charset="0"/>
-              <a:buChar char="•"/>
-            </a:pPr>
-            <a:r>
-              <a:rPr lang="en-US" dirty="0" smtClean="0"/>
-              <a:t>Sounds ON/OFF</a:t>
-            </a:r>
-          </a:p>
-          <a:p>
-            <a:pPr marL="285750" indent="-285750">
-              <a:buFont typeface="Arial" panose="020B0604020202020204" pitchFamily="34" charset="0"/>
-              <a:buChar char="•"/>
-            </a:pPr>
-            <a:r>
-              <a:rPr lang="en-US" dirty="0" smtClean="0"/>
-              <a:t>Alerts ON/OFF</a:t>
-            </a:r>
-          </a:p>
-          <a:p>
-            <a:pPr marL="285750" indent="-285750">
-              <a:buFont typeface="Arial" panose="020B0604020202020204" pitchFamily="34" charset="0"/>
-              <a:buChar char="•"/>
-            </a:pPr>
-            <a:r>
-              <a:rPr lang="en-US" dirty="0" smtClean="0"/>
-              <a:t>Set your Screen Name</a:t>
-            </a:r>
+              <a:rPr lang="en-US" dirty="0" smtClean="0">
+                <a:solidFill>
+                  <a:srgbClr val="FF0000"/>
+                </a:solidFill>
+              </a:rPr>
+              <a:t>Settings (Gear)</a:t>
+            </a:r>
+            <a:endParaRPr lang="en-US" dirty="0" smtClean="0">
+              <a:solidFill>
+                <a:srgbClr val="FF0000"/>
+              </a:solidFill>
+            </a:endParaRPr>
           </a:p>
         </p:txBody>
       </p:sp>
@@ -3995,6 +3984,165 @@
     <p:extLst>
       <p:ext uri="{BB962C8B-B14F-4D97-AF65-F5344CB8AC3E}">
         <p14:creationId xmlns:p14="http://schemas.microsoft.com/office/powerpoint/2010/main" val="466069798"/>
+      </p:ext>
+    </p:extLst>
+  </p:cSld>
+  <p:clrMapOvr>
+    <a:masterClrMapping/>
+  </p:clrMapOvr>
+</p:sld>
+</file>
+
+<file path=ppt/slides/slide3.xml><?xml version="1.0" encoding="utf-8"?>
+<p:sld xmlns:a="http://schemas.openxmlformats.org/drawingml/2006/main" xmlns:r="http://schemas.openxmlformats.org/officeDocument/2006/relationships" xmlns:p="http://schemas.openxmlformats.org/presentationml/2006/main">
+  <p:cSld>
+    <p:spTree>
+      <p:nvGrpSpPr>
+        <p:cNvPr id="1" name=""/>
+        <p:cNvGrpSpPr/>
+        <p:nvPr/>
+      </p:nvGrpSpPr>
+      <p:grpSpPr>
+        <a:xfrm>
+          <a:off x="0" y="0"/>
+          <a:ext cx="0" cy="0"/>
+          <a:chOff x="0" y="0"/>
+          <a:chExt cx="0" cy="0"/>
+        </a:xfrm>
+      </p:grpSpPr>
+      <p:sp>
+        <p:nvSpPr>
+          <p:cNvPr id="2" name="Title 1"/>
+          <p:cNvSpPr>
+            <a:spLocks noGrp="1"/>
+          </p:cNvSpPr>
+          <p:nvPr>
+            <p:ph type="title"/>
+          </p:nvPr>
+        </p:nvSpPr>
+        <p:spPr>
+          <a:xfrm>
+            <a:off x="0" y="0"/>
+            <a:ext cx="10515600" cy="1325563"/>
+          </a:xfrm>
+        </p:spPr>
+        <p:txBody>
+          <a:bodyPr/>
+          <a:lstStyle/>
+          <a:p>
+            <a:r>
+              <a:rPr lang="en-US" dirty="0" smtClean="0"/>
+              <a:t>Mock Up – Screens – Visual Version</a:t>
+            </a:r>
+            <a:endParaRPr lang="en-US" dirty="0"/>
+          </a:p>
+        </p:txBody>
+      </p:sp>
+      <p:grpSp>
+        <p:nvGrpSpPr>
+          <p:cNvPr id="6" name="Group 5"/>
+          <p:cNvGrpSpPr/>
+          <p:nvPr/>
+        </p:nvGrpSpPr>
+        <p:grpSpPr>
+          <a:xfrm>
+            <a:off x="248654" y="1552074"/>
+            <a:ext cx="2779294" cy="5305926"/>
+            <a:chOff x="248654" y="1552074"/>
+            <a:chExt cx="2779294" cy="5305926"/>
+          </a:xfrm>
+        </p:grpSpPr>
+        <p:sp>
+          <p:nvSpPr>
+            <p:cNvPr id="4" name="Rounded Rectangle 3"/>
+            <p:cNvSpPr/>
+            <p:nvPr/>
+          </p:nvSpPr>
+          <p:spPr>
+            <a:xfrm>
+              <a:off x="248654" y="1552074"/>
+              <a:ext cx="2779294" cy="5305926"/>
+            </a:xfrm>
+            <a:prstGeom prst="roundRect">
+              <a:avLst/>
+            </a:prstGeom>
+            <a:solidFill>
+              <a:schemeClr val="tx1"/>
+            </a:solidFill>
+          </p:spPr>
+          <p:style>
+            <a:lnRef idx="2">
+              <a:schemeClr val="accent1">
+                <a:shade val="50000"/>
+              </a:schemeClr>
+            </a:lnRef>
+            <a:fillRef idx="1">
+              <a:schemeClr val="accent1"/>
+            </a:fillRef>
+            <a:effectRef idx="0">
+              <a:schemeClr val="accent1"/>
+            </a:effectRef>
+            <a:fontRef idx="minor">
+              <a:schemeClr val="lt1"/>
+            </a:fontRef>
+          </p:style>
+          <p:txBody>
+            <a:bodyPr rtlCol="0" anchor="ctr"/>
+            <a:lstStyle/>
+            <a:p>
+              <a:pPr algn="ctr"/>
+              <a:endParaRPr lang="en-US"/>
+            </a:p>
+          </p:txBody>
+        </p:sp>
+        <p:sp>
+          <p:nvSpPr>
+            <p:cNvPr id="5" name="Rounded Rectangle 4"/>
+            <p:cNvSpPr/>
+            <p:nvPr/>
+          </p:nvSpPr>
+          <p:spPr>
+            <a:xfrm>
+              <a:off x="519941" y="1840832"/>
+              <a:ext cx="2236722" cy="4764505"/>
+            </a:xfrm>
+            <a:prstGeom prst="roundRect">
+              <a:avLst/>
+            </a:prstGeom>
+            <a:solidFill>
+              <a:schemeClr val="bg1"/>
+            </a:solidFill>
+          </p:spPr>
+          <p:style>
+            <a:lnRef idx="2">
+              <a:schemeClr val="accent1">
+                <a:shade val="50000"/>
+              </a:schemeClr>
+            </a:lnRef>
+            <a:fillRef idx="1">
+              <a:schemeClr val="accent1"/>
+            </a:fillRef>
+            <a:effectRef idx="0">
+              <a:schemeClr val="accent1"/>
+            </a:effectRef>
+            <a:fontRef idx="minor">
+              <a:schemeClr val="lt1"/>
+            </a:fontRef>
+          </p:style>
+          <p:txBody>
+            <a:bodyPr rtlCol="0" anchor="ctr"/>
+            <a:lstStyle/>
+            <a:p>
+              <a:pPr algn="ctr"/>
+              <a:endParaRPr lang="en-US"/>
+            </a:p>
+          </p:txBody>
+        </p:sp>
+      </p:grpSp>
+    </p:spTree>
+    <p:extLst>
+      <p:ext uri="{BB962C8B-B14F-4D97-AF65-F5344CB8AC3E}">
+        <p14:creationId xmlns:p14="http://schemas.microsoft.com/office/powerpoint/2010/main" val="1175293212"/>
       </p:ext>
     </p:extLst>
   </p:cSld>

</xml_diff>